<commit_message>
Projektmappe und Präsi für Zyklus 1
</commit_message>
<xml_diff>
--- a/material/artefakte/Gruppe12_Zyklus1.pptx
+++ b/material/artefakte/Gruppe12_Zyklus1.pptx
@@ -5,10 +5,10 @@
     <p:sldMasterId id="2147483648" r:id="rId1"/>
   </p:sldMasterIdLst>
   <p:notesMasterIdLst>
-    <p:notesMasterId r:id="rId23"/>
+    <p:notesMasterId r:id="rId24"/>
   </p:notesMasterIdLst>
   <p:handoutMasterIdLst>
-    <p:handoutMasterId r:id="rId24"/>
+    <p:handoutMasterId r:id="rId25"/>
   </p:handoutMasterIdLst>
   <p:sldIdLst>
     <p:sldId id="277" r:id="rId2"/>
@@ -31,7 +31,8 @@
     <p:sldId id="297" r:id="rId19"/>
     <p:sldId id="278" r:id="rId20"/>
     <p:sldId id="268" r:id="rId21"/>
-    <p:sldId id="288" r:id="rId22"/>
+    <p:sldId id="302" r:id="rId22"/>
+    <p:sldId id="288" r:id="rId23"/>
   </p:sldIdLst>
   <p:sldSz cx="12192000" cy="6858000"/>
   <p:notesSz cx="6669088" cy="9928225"/>
@@ -1071,7 +1072,7 @@
           <a:bodyPr/>
           <a:lstStyle/>
           <a:p>
-            <a:pPr marL="180975" marR="0" lvl="0" indent="-180975" algn="l" defTabSz="914400" rtl="0" eaLnBrk="0" fontAlgn="base" latinLnBrk="0" hangingPunct="0">
+            <a:pPr marL="0" marR="0" lvl="0" indent="0" algn="l" defTabSz="914400" rtl="0" eaLnBrk="0" fontAlgn="base" latinLnBrk="0" hangingPunct="0">
               <a:lnSpc>
                 <a:spcPct val="100000"/>
               </a:lnSpc>
@@ -1086,154 +1087,7 @@
               </a:buClr>
               <a:buSzPct val="75000"/>
               <a:buFont typeface="Lucida Grande" pitchFamily="-111" charset="0"/>
-              <a:buChar char="•"/>
-              <a:tabLst/>
-              <a:defRPr/>
-            </a:pPr>
-            <a:r>
-              <a:rPr lang="en-US" altLang="en-US" dirty="0">
-                <a:latin typeface="Verdana" panose="020B0604030504040204" pitchFamily="34" charset="0"/>
-                <a:cs typeface="Verdana" panose="020B0604030504040204" pitchFamily="34" charset="0"/>
-              </a:rPr>
-              <a:t>9:</a:t>
-            </a:r>
-            <a:r>
-              <a:rPr lang="de-DE" sz="1200" kern="1200" dirty="0">
-                <a:solidFill>
-                  <a:schemeClr val="tx1"/>
-                </a:solidFill>
-                <a:effectLst/>
-                <a:latin typeface="Verdana"/>
-                <a:ea typeface="ＭＳ Ｐゴシック" panose="020B0600070205080204" pitchFamily="34" charset="-128"/>
-                <a:cs typeface="Verdana"/>
-              </a:rPr>
-              <a:t>Als Privatkunde möchte ich auf der Startseite laufende Auktionen sehen, auf welche ich selber geboten habe, sodass ich ggf. weiter überbieten kann. </a:t>
-            </a:r>
-            <a:endParaRPr lang="en-US" altLang="en-US" dirty="0">
-              <a:latin typeface="Verdana" panose="020B0604030504040204" pitchFamily="34" charset="0"/>
-              <a:cs typeface="Verdana" panose="020B0604030504040204" pitchFamily="34" charset="0"/>
-            </a:endParaRPr>
-          </a:p>
-          <a:p>
-            <a:pPr marL="180975" marR="0" lvl="0" indent="-180975" algn="l" defTabSz="914400" rtl="0" eaLnBrk="0" fontAlgn="base" latinLnBrk="0" hangingPunct="0">
-              <a:lnSpc>
-                <a:spcPct val="100000"/>
-              </a:lnSpc>
-              <a:spcBef>
-                <a:spcPct val="30000"/>
-              </a:spcBef>
-              <a:spcAft>
-                <a:spcPct val="0"/>
-              </a:spcAft>
-              <a:buClr>
-                <a:srgbClr val="304090"/>
-              </a:buClr>
-              <a:buSzPct val="75000"/>
-              <a:buFont typeface="Lucida Grande" pitchFamily="-111" charset="0"/>
-              <a:buChar char="•"/>
-              <a:tabLst/>
-              <a:defRPr/>
-            </a:pPr>
-            <a:r>
-              <a:rPr lang="en-US" altLang="en-US" dirty="0">
-                <a:latin typeface="Verdana" panose="020B0604030504040204" pitchFamily="34" charset="0"/>
-                <a:cs typeface="Verdana" panose="020B0604030504040204" pitchFamily="34" charset="0"/>
-              </a:rPr>
-              <a:t>10: </a:t>
-            </a:r>
-            <a:r>
-              <a:rPr lang="de-DE" sz="1200" kern="1200" dirty="0">
-                <a:solidFill>
-                  <a:schemeClr val="tx1"/>
-                </a:solidFill>
-                <a:effectLst/>
-                <a:latin typeface="Verdana"/>
-                <a:ea typeface="ＭＳ Ｐゴシック" panose="020B0600070205080204" pitchFamily="34" charset="-128"/>
-                <a:cs typeface="Verdana"/>
-              </a:rPr>
-              <a:t>Als Privatkunde möchte ich auf der Startseite meine laufenden Auktionen angezeigt bekommen, um meinen Gebotsstand jederzeit zu überblicken.</a:t>
-            </a:r>
-            <a:endParaRPr lang="en-US" sz="1200" kern="1200" dirty="0">
-              <a:solidFill>
-                <a:schemeClr val="tx1"/>
-              </a:solidFill>
-              <a:effectLst/>
-              <a:latin typeface="Verdana" panose="020B0604030504040204" pitchFamily="34" charset="0"/>
-              <a:ea typeface="ＭＳ Ｐゴシック" panose="020B0600070205080204" pitchFamily="34" charset="-128"/>
-              <a:cs typeface="Verdana"/>
-            </a:endParaRPr>
-          </a:p>
-          <a:p>
-            <a:pPr marL="180975" marR="0" lvl="0" indent="-180975" algn="l" defTabSz="914400" rtl="0" eaLnBrk="0" fontAlgn="base" latinLnBrk="0" hangingPunct="0">
-              <a:lnSpc>
-                <a:spcPct val="100000"/>
-              </a:lnSpc>
-              <a:spcBef>
-                <a:spcPct val="30000"/>
-              </a:spcBef>
-              <a:spcAft>
-                <a:spcPct val="0"/>
-              </a:spcAft>
-              <a:buClr>
-                <a:srgbClr val="304090"/>
-              </a:buClr>
-              <a:buSzPct val="75000"/>
-              <a:buFont typeface="Lucida Grande" pitchFamily="-111" charset="0"/>
-              <a:buChar char="•"/>
-              <a:tabLst/>
-              <a:defRPr/>
-            </a:pPr>
-            <a:r>
-              <a:rPr lang="en-US" sz="1200" kern="1200" dirty="0">
-                <a:solidFill>
-                  <a:schemeClr val="tx1"/>
-                </a:solidFill>
-                <a:effectLst/>
-                <a:latin typeface="Verdana" panose="020B0604030504040204" pitchFamily="34" charset="0"/>
-                <a:ea typeface="ＭＳ Ｐゴシック" panose="020B0600070205080204" pitchFamily="34" charset="-128"/>
-                <a:cs typeface="Verdana"/>
-              </a:rPr>
-              <a:t>11: </a:t>
-            </a:r>
-            <a:r>
-              <a:rPr lang="de-DE" sz="1200" kern="1200" dirty="0">
-                <a:solidFill>
-                  <a:schemeClr val="tx1"/>
-                </a:solidFill>
-                <a:effectLst/>
-                <a:latin typeface="Verdana"/>
-                <a:ea typeface="ＭＳ Ｐゴシック" panose="020B0600070205080204" pitchFamily="34" charset="-128"/>
-                <a:cs typeface="Verdana"/>
-              </a:rPr>
-              <a:t>Als Privatkunde möchte ich auf der Startseite meine gemerkten Auktionen angezeigt bekommen, um bedarfsweise doch an den Auktionen teilnehmen zu können.</a:t>
-            </a:r>
-            <a:endParaRPr lang="en-DE" sz="1200" kern="1200" dirty="0">
-              <a:solidFill>
-                <a:schemeClr val="tx1"/>
-              </a:solidFill>
-              <a:effectLst/>
-              <a:latin typeface="Verdana"/>
-              <a:ea typeface="ＭＳ Ｐゴシック" panose="020B0600070205080204" pitchFamily="34" charset="-128"/>
-              <a:cs typeface="Verdana"/>
-            </a:endParaRPr>
-          </a:p>
-          <a:p>
-            <a:pPr marL="180975" marR="0" lvl="0" indent="-180975" algn="l" defTabSz="914400" rtl="0" eaLnBrk="0" fontAlgn="base" latinLnBrk="0" hangingPunct="0">
-              <a:lnSpc>
-                <a:spcPct val="100000"/>
-              </a:lnSpc>
-              <a:spcBef>
-                <a:spcPct val="30000"/>
-              </a:spcBef>
-              <a:spcAft>
-                <a:spcPct val="0"/>
-              </a:spcAft>
-              <a:buClr>
-                <a:srgbClr val="304090"/>
-              </a:buClr>
-              <a:buSzPct val="75000"/>
-              <a:buFont typeface="Lucida Grande" pitchFamily="-111" charset="0"/>
-              <a:buChar char="•"/>
+              <a:buNone/>
               <a:tabLst/>
               <a:defRPr/>
             </a:pPr>
@@ -1337,7 +1191,7 @@
           <a:bodyPr/>
           <a:lstStyle/>
           <a:p>
-            <a:pPr marL="180975" marR="0" lvl="0" indent="-180975" algn="l" defTabSz="914400" rtl="0" eaLnBrk="0" fontAlgn="base" latinLnBrk="0" hangingPunct="0">
+            <a:pPr marL="0" marR="0" lvl="0" indent="0" algn="l" defTabSz="914400" rtl="0" eaLnBrk="0" fontAlgn="base" latinLnBrk="0" hangingPunct="0">
               <a:lnSpc>
                 <a:spcPct val="100000"/>
               </a:lnSpc>
@@ -1352,154 +1206,7 @@
               </a:buClr>
               <a:buSzPct val="75000"/>
               <a:buFont typeface="Lucida Grande" pitchFamily="-111" charset="0"/>
-              <a:buChar char="•"/>
-              <a:tabLst/>
-              <a:defRPr/>
-            </a:pPr>
-            <a:r>
-              <a:rPr lang="en-US" altLang="en-US" dirty="0">
-                <a:latin typeface="Verdana" panose="020B0604030504040204" pitchFamily="34" charset="0"/>
-                <a:cs typeface="Verdana" panose="020B0604030504040204" pitchFamily="34" charset="0"/>
-              </a:rPr>
-              <a:t>9:</a:t>
-            </a:r>
-            <a:r>
-              <a:rPr lang="de-DE" sz="1200" kern="1200" dirty="0">
-                <a:solidFill>
-                  <a:schemeClr val="tx1"/>
-                </a:solidFill>
-                <a:effectLst/>
-                <a:latin typeface="Verdana"/>
-                <a:ea typeface="ＭＳ Ｐゴシック" panose="020B0600070205080204" pitchFamily="34" charset="-128"/>
-                <a:cs typeface="Verdana"/>
-              </a:rPr>
-              <a:t>Als Privatkunde möchte ich auf der Startseite laufende Auktionen sehen, auf welche ich selber geboten habe, sodass ich ggf. weiter überbieten kann. </a:t>
-            </a:r>
-            <a:endParaRPr lang="en-US" altLang="en-US" dirty="0">
-              <a:latin typeface="Verdana" panose="020B0604030504040204" pitchFamily="34" charset="0"/>
-              <a:cs typeface="Verdana" panose="020B0604030504040204" pitchFamily="34" charset="0"/>
-            </a:endParaRPr>
-          </a:p>
-          <a:p>
-            <a:pPr marL="180975" marR="0" lvl="0" indent="-180975" algn="l" defTabSz="914400" rtl="0" eaLnBrk="0" fontAlgn="base" latinLnBrk="0" hangingPunct="0">
-              <a:lnSpc>
-                <a:spcPct val="100000"/>
-              </a:lnSpc>
-              <a:spcBef>
-                <a:spcPct val="30000"/>
-              </a:spcBef>
-              <a:spcAft>
-                <a:spcPct val="0"/>
-              </a:spcAft>
-              <a:buClr>
-                <a:srgbClr val="304090"/>
-              </a:buClr>
-              <a:buSzPct val="75000"/>
-              <a:buFont typeface="Lucida Grande" pitchFamily="-111" charset="0"/>
-              <a:buChar char="•"/>
-              <a:tabLst/>
-              <a:defRPr/>
-            </a:pPr>
-            <a:r>
-              <a:rPr lang="en-US" altLang="en-US" dirty="0">
-                <a:latin typeface="Verdana" panose="020B0604030504040204" pitchFamily="34" charset="0"/>
-                <a:cs typeface="Verdana" panose="020B0604030504040204" pitchFamily="34" charset="0"/>
-              </a:rPr>
-              <a:t>10: </a:t>
-            </a:r>
-            <a:r>
-              <a:rPr lang="de-DE" sz="1200" kern="1200" dirty="0">
-                <a:solidFill>
-                  <a:schemeClr val="tx1"/>
-                </a:solidFill>
-                <a:effectLst/>
-                <a:latin typeface="Verdana"/>
-                <a:ea typeface="ＭＳ Ｐゴシック" panose="020B0600070205080204" pitchFamily="34" charset="-128"/>
-                <a:cs typeface="Verdana"/>
-              </a:rPr>
-              <a:t>Als Privatkunde möchte ich auf der Startseite meine laufenden Auktionen angezeigt bekommen, um meinen Gebotsstand jederzeit zu überblicken.</a:t>
-            </a:r>
-            <a:endParaRPr lang="en-US" sz="1200" kern="1200" dirty="0">
-              <a:solidFill>
-                <a:schemeClr val="tx1"/>
-              </a:solidFill>
-              <a:effectLst/>
-              <a:latin typeface="Verdana" panose="020B0604030504040204" pitchFamily="34" charset="0"/>
-              <a:ea typeface="ＭＳ Ｐゴシック" panose="020B0600070205080204" pitchFamily="34" charset="-128"/>
-              <a:cs typeface="Verdana"/>
-            </a:endParaRPr>
-          </a:p>
-          <a:p>
-            <a:pPr marL="180975" marR="0" lvl="0" indent="-180975" algn="l" defTabSz="914400" rtl="0" eaLnBrk="0" fontAlgn="base" latinLnBrk="0" hangingPunct="0">
-              <a:lnSpc>
-                <a:spcPct val="100000"/>
-              </a:lnSpc>
-              <a:spcBef>
-                <a:spcPct val="30000"/>
-              </a:spcBef>
-              <a:spcAft>
-                <a:spcPct val="0"/>
-              </a:spcAft>
-              <a:buClr>
-                <a:srgbClr val="304090"/>
-              </a:buClr>
-              <a:buSzPct val="75000"/>
-              <a:buFont typeface="Lucida Grande" pitchFamily="-111" charset="0"/>
-              <a:buChar char="•"/>
-              <a:tabLst/>
-              <a:defRPr/>
-            </a:pPr>
-            <a:r>
-              <a:rPr lang="en-US" sz="1200" kern="1200" dirty="0">
-                <a:solidFill>
-                  <a:schemeClr val="tx1"/>
-                </a:solidFill>
-                <a:effectLst/>
-                <a:latin typeface="Verdana" panose="020B0604030504040204" pitchFamily="34" charset="0"/>
-                <a:ea typeface="ＭＳ Ｐゴシック" panose="020B0600070205080204" pitchFamily="34" charset="-128"/>
-                <a:cs typeface="Verdana"/>
-              </a:rPr>
-              <a:t>11: </a:t>
-            </a:r>
-            <a:r>
-              <a:rPr lang="de-DE" sz="1200" kern="1200" dirty="0">
-                <a:solidFill>
-                  <a:schemeClr val="tx1"/>
-                </a:solidFill>
-                <a:effectLst/>
-                <a:latin typeface="Verdana"/>
-                <a:ea typeface="ＭＳ Ｐゴシック" panose="020B0600070205080204" pitchFamily="34" charset="-128"/>
-                <a:cs typeface="Verdana"/>
-              </a:rPr>
-              <a:t>Als Privatkunde möchte ich auf der Startseite meine gemerkten Auktionen angezeigt bekommen, um bedarfsweise doch an den Auktionen teilnehmen zu können.</a:t>
-            </a:r>
-            <a:endParaRPr lang="en-DE" sz="1200" kern="1200" dirty="0">
-              <a:solidFill>
-                <a:schemeClr val="tx1"/>
-              </a:solidFill>
-              <a:effectLst/>
-              <a:latin typeface="Verdana"/>
-              <a:ea typeface="ＭＳ Ｐゴシック" panose="020B0600070205080204" pitchFamily="34" charset="-128"/>
-              <a:cs typeface="Verdana"/>
-            </a:endParaRPr>
-          </a:p>
-          <a:p>
-            <a:pPr marL="180975" marR="0" lvl="0" indent="-180975" algn="l" defTabSz="914400" rtl="0" eaLnBrk="0" fontAlgn="base" latinLnBrk="0" hangingPunct="0">
-              <a:lnSpc>
-                <a:spcPct val="100000"/>
-              </a:lnSpc>
-              <a:spcBef>
-                <a:spcPct val="30000"/>
-              </a:spcBef>
-              <a:spcAft>
-                <a:spcPct val="0"/>
-              </a:spcAft>
-              <a:buClr>
-                <a:srgbClr val="304090"/>
-              </a:buClr>
-              <a:buSzPct val="75000"/>
-              <a:buFont typeface="Lucida Grande" pitchFamily="-111" charset="0"/>
-              <a:buChar char="•"/>
+              <a:buNone/>
               <a:tabLst/>
               <a:defRPr/>
             </a:pPr>
@@ -1608,7 +1315,7 @@
           <a:bodyPr/>
           <a:lstStyle/>
           <a:p>
-            <a:pPr marL="180975" marR="0" lvl="0" indent="-180975" algn="l" defTabSz="914400" rtl="0" eaLnBrk="0" fontAlgn="base" latinLnBrk="0" hangingPunct="0">
+            <a:pPr marL="0" marR="0" lvl="0" indent="0" algn="l" defTabSz="914400" rtl="0" eaLnBrk="0" fontAlgn="base" latinLnBrk="0" hangingPunct="0">
               <a:lnSpc>
                 <a:spcPct val="100000"/>
               </a:lnSpc>
@@ -1623,154 +1330,7 @@
               </a:buClr>
               <a:buSzPct val="75000"/>
               <a:buFont typeface="Lucida Grande" pitchFamily="-111" charset="0"/>
-              <a:buChar char="•"/>
-              <a:tabLst/>
-              <a:defRPr/>
-            </a:pPr>
-            <a:r>
-              <a:rPr lang="en-US" altLang="en-US" dirty="0">
-                <a:latin typeface="Verdana" panose="020B0604030504040204" pitchFamily="34" charset="0"/>
-                <a:cs typeface="Verdana" panose="020B0604030504040204" pitchFamily="34" charset="0"/>
-              </a:rPr>
-              <a:t>9:</a:t>
-            </a:r>
-            <a:r>
-              <a:rPr lang="de-DE" sz="1200" kern="1200" dirty="0">
-                <a:solidFill>
-                  <a:schemeClr val="tx1"/>
-                </a:solidFill>
-                <a:effectLst/>
-                <a:latin typeface="Verdana"/>
-                <a:ea typeface="ＭＳ Ｐゴシック" panose="020B0600070205080204" pitchFamily="34" charset="-128"/>
-                <a:cs typeface="Verdana"/>
-              </a:rPr>
-              <a:t>Als Privatkunde möchte ich auf der Startseite laufende Auktionen sehen, auf welche ich selber geboten habe, sodass ich ggf. weiter überbieten kann. </a:t>
-            </a:r>
-            <a:endParaRPr lang="en-US" altLang="en-US" dirty="0">
-              <a:latin typeface="Verdana" panose="020B0604030504040204" pitchFamily="34" charset="0"/>
-              <a:cs typeface="Verdana" panose="020B0604030504040204" pitchFamily="34" charset="0"/>
-            </a:endParaRPr>
-          </a:p>
-          <a:p>
-            <a:pPr marL="180975" marR="0" lvl="0" indent="-180975" algn="l" defTabSz="914400" rtl="0" eaLnBrk="0" fontAlgn="base" latinLnBrk="0" hangingPunct="0">
-              <a:lnSpc>
-                <a:spcPct val="100000"/>
-              </a:lnSpc>
-              <a:spcBef>
-                <a:spcPct val="30000"/>
-              </a:spcBef>
-              <a:spcAft>
-                <a:spcPct val="0"/>
-              </a:spcAft>
-              <a:buClr>
-                <a:srgbClr val="304090"/>
-              </a:buClr>
-              <a:buSzPct val="75000"/>
-              <a:buFont typeface="Lucida Grande" pitchFamily="-111" charset="0"/>
-              <a:buChar char="•"/>
-              <a:tabLst/>
-              <a:defRPr/>
-            </a:pPr>
-            <a:r>
-              <a:rPr lang="en-US" altLang="en-US" dirty="0">
-                <a:latin typeface="Verdana" panose="020B0604030504040204" pitchFamily="34" charset="0"/>
-                <a:cs typeface="Verdana" panose="020B0604030504040204" pitchFamily="34" charset="0"/>
-              </a:rPr>
-              <a:t>10: </a:t>
-            </a:r>
-            <a:r>
-              <a:rPr lang="de-DE" sz="1200" kern="1200" dirty="0">
-                <a:solidFill>
-                  <a:schemeClr val="tx1"/>
-                </a:solidFill>
-                <a:effectLst/>
-                <a:latin typeface="Verdana"/>
-                <a:ea typeface="ＭＳ Ｐゴシック" panose="020B0600070205080204" pitchFamily="34" charset="-128"/>
-                <a:cs typeface="Verdana"/>
-              </a:rPr>
-              <a:t>Als Privatkunde möchte ich auf der Startseite meine laufenden Auktionen angezeigt bekommen, um meinen Gebotsstand jederzeit zu überblicken.</a:t>
-            </a:r>
-            <a:endParaRPr lang="en-US" sz="1200" kern="1200" dirty="0">
-              <a:solidFill>
-                <a:schemeClr val="tx1"/>
-              </a:solidFill>
-              <a:effectLst/>
-              <a:latin typeface="Verdana" panose="020B0604030504040204" pitchFamily="34" charset="0"/>
-              <a:ea typeface="ＭＳ Ｐゴシック" panose="020B0600070205080204" pitchFamily="34" charset="-128"/>
-              <a:cs typeface="Verdana"/>
-            </a:endParaRPr>
-          </a:p>
-          <a:p>
-            <a:pPr marL="180975" marR="0" lvl="0" indent="-180975" algn="l" defTabSz="914400" rtl="0" eaLnBrk="0" fontAlgn="base" latinLnBrk="0" hangingPunct="0">
-              <a:lnSpc>
-                <a:spcPct val="100000"/>
-              </a:lnSpc>
-              <a:spcBef>
-                <a:spcPct val="30000"/>
-              </a:spcBef>
-              <a:spcAft>
-                <a:spcPct val="0"/>
-              </a:spcAft>
-              <a:buClr>
-                <a:srgbClr val="304090"/>
-              </a:buClr>
-              <a:buSzPct val="75000"/>
-              <a:buFont typeface="Lucida Grande" pitchFamily="-111" charset="0"/>
-              <a:buChar char="•"/>
-              <a:tabLst/>
-              <a:defRPr/>
-            </a:pPr>
-            <a:r>
-              <a:rPr lang="en-US" sz="1200" kern="1200" dirty="0">
-                <a:solidFill>
-                  <a:schemeClr val="tx1"/>
-                </a:solidFill>
-                <a:effectLst/>
-                <a:latin typeface="Verdana" panose="020B0604030504040204" pitchFamily="34" charset="0"/>
-                <a:ea typeface="ＭＳ Ｐゴシック" panose="020B0600070205080204" pitchFamily="34" charset="-128"/>
-                <a:cs typeface="Verdana"/>
-              </a:rPr>
-              <a:t>11: </a:t>
-            </a:r>
-            <a:r>
-              <a:rPr lang="de-DE" sz="1200" kern="1200" dirty="0">
-                <a:solidFill>
-                  <a:schemeClr val="tx1"/>
-                </a:solidFill>
-                <a:effectLst/>
-                <a:latin typeface="Verdana"/>
-                <a:ea typeface="ＭＳ Ｐゴシック" panose="020B0600070205080204" pitchFamily="34" charset="-128"/>
-                <a:cs typeface="Verdana"/>
-              </a:rPr>
-              <a:t>Als Privatkunde möchte ich auf der Startseite meine gemerkten Auktionen angezeigt bekommen, um bedarfsweise doch an den Auktionen teilnehmen zu können.</a:t>
-            </a:r>
-            <a:endParaRPr lang="en-DE" sz="1200" kern="1200" dirty="0">
-              <a:solidFill>
-                <a:schemeClr val="tx1"/>
-              </a:solidFill>
-              <a:effectLst/>
-              <a:latin typeface="Verdana"/>
-              <a:ea typeface="ＭＳ Ｐゴシック" panose="020B0600070205080204" pitchFamily="34" charset="-128"/>
-              <a:cs typeface="Verdana"/>
-            </a:endParaRPr>
-          </a:p>
-          <a:p>
-            <a:pPr marL="180975" marR="0" lvl="0" indent="-180975" algn="l" defTabSz="914400" rtl="0" eaLnBrk="0" fontAlgn="base" latinLnBrk="0" hangingPunct="0">
-              <a:lnSpc>
-                <a:spcPct val="100000"/>
-              </a:lnSpc>
-              <a:spcBef>
-                <a:spcPct val="30000"/>
-              </a:spcBef>
-              <a:spcAft>
-                <a:spcPct val="0"/>
-              </a:spcAft>
-              <a:buClr>
-                <a:srgbClr val="304090"/>
-              </a:buClr>
-              <a:buSzPct val="75000"/>
-              <a:buFont typeface="Lucida Grande" pitchFamily="-111" charset="0"/>
-              <a:buChar char="•"/>
+              <a:buNone/>
               <a:tabLst/>
               <a:defRPr/>
             </a:pPr>
@@ -16072,12 +15632,30 @@
           <a:p>
             <a:pPr eaLnBrk="1" hangingPunct="1"/>
             <a:r>
-              <a:rPr lang="en-US" altLang="en-US">
+              <a:rPr lang="en-US" altLang="en-US" dirty="0" err="1">
                 <a:latin typeface="Verdana" panose="020B0604030504040204" pitchFamily="34" charset="0"/>
                 <a:cs typeface="Verdana" panose="020B0604030504040204" pitchFamily="34" charset="0"/>
               </a:rPr>
               <a:t>bMSC</a:t>
             </a:r>
+            <a:r>
+              <a:rPr lang="en-US" altLang="en-US" dirty="0">
+                <a:latin typeface="Verdana" panose="020B0604030504040204" pitchFamily="34" charset="0"/>
+                <a:cs typeface="Verdana" panose="020B0604030504040204" pitchFamily="34" charset="0"/>
+              </a:rPr>
+              <a:t> – Restaurant </a:t>
+            </a:r>
+            <a:r>
+              <a:rPr lang="en-US" altLang="en-US" dirty="0" err="1">
+                <a:latin typeface="Verdana" panose="020B0604030504040204" pitchFamily="34" charset="0"/>
+                <a:cs typeface="Verdana" panose="020B0604030504040204" pitchFamily="34" charset="0"/>
+              </a:rPr>
+              <a:t>anlegen</a:t>
+            </a:r>
+            <a:endParaRPr lang="en-US" altLang="en-US" dirty="0">
+              <a:latin typeface="Verdana" panose="020B0604030504040204" pitchFamily="34" charset="0"/>
+              <a:cs typeface="Verdana" panose="020B0604030504040204" pitchFamily="34" charset="0"/>
+            </a:endParaRPr>
           </a:p>
         </p:txBody>
       </p:sp>
@@ -16516,12 +16094,30 @@
           <a:p>
             <a:pPr eaLnBrk="1" hangingPunct="1"/>
             <a:r>
-              <a:rPr lang="en-US" altLang="en-US">
+              <a:rPr lang="en-US" altLang="en-US" dirty="0" err="1">
                 <a:latin typeface="Verdana" panose="020B0604030504040204" pitchFamily="34" charset="0"/>
                 <a:cs typeface="Verdana" panose="020B0604030504040204" pitchFamily="34" charset="0"/>
               </a:rPr>
               <a:t>bMSC</a:t>
             </a:r>
+            <a:r>
+              <a:rPr lang="en-US" altLang="en-US" dirty="0">
+                <a:latin typeface="Verdana" panose="020B0604030504040204" pitchFamily="34" charset="0"/>
+                <a:cs typeface="Verdana" panose="020B0604030504040204" pitchFamily="34" charset="0"/>
+              </a:rPr>
+              <a:t> – Restaurant </a:t>
+            </a:r>
+            <a:r>
+              <a:rPr lang="en-US" altLang="en-US" dirty="0" err="1">
+                <a:latin typeface="Verdana" panose="020B0604030504040204" pitchFamily="34" charset="0"/>
+                <a:cs typeface="Verdana" panose="020B0604030504040204" pitchFamily="34" charset="0"/>
+              </a:rPr>
+              <a:t>ändern</a:t>
+            </a:r>
+            <a:endParaRPr lang="en-US" altLang="en-US" dirty="0">
+              <a:latin typeface="Verdana" panose="020B0604030504040204" pitchFamily="34" charset="0"/>
+              <a:cs typeface="Verdana" panose="020B0604030504040204" pitchFamily="34" charset="0"/>
+            </a:endParaRPr>
           </a:p>
         </p:txBody>
       </p:sp>
@@ -17269,7 +16865,7 @@
         </p:nvSpPr>
         <p:spPr bwMode="auto">
           <a:xfrm>
-            <a:off x="263525" y="688975"/>
+            <a:off x="312952" y="623433"/>
             <a:ext cx="13412788" cy="46038"/>
           </a:xfrm>
           <a:prstGeom prst="rect">
@@ -17447,8 +17043,8 @@
         </p:blipFill>
         <p:spPr>
           <a:xfrm>
-            <a:off x="4725602" y="238125"/>
-            <a:ext cx="4699255" cy="6030509"/>
+            <a:off x="4725602" y="661975"/>
+            <a:ext cx="4368971" cy="5606659"/>
           </a:xfrm>
           <a:prstGeom prst="rect">
             <a:avLst/>
@@ -20614,11 +20210,25 @@
           <a:p>
             <a:pPr eaLnBrk="1" hangingPunct="1"/>
             <a:r>
-              <a:rPr lang="en-US" altLang="en-US">
+              <a:rPr lang="en-US" altLang="en-US" dirty="0">
                 <a:latin typeface="Verdana" panose="020B0604030504040204" pitchFamily="34" charset="0"/>
                 <a:cs typeface="Verdana" panose="020B0604030504040204" pitchFamily="34" charset="0"/>
               </a:rPr>
-              <a:t>UML-Klassendiagramm</a:t>
+              <a:t>UML-</a:t>
+            </a:r>
+            <a:r>
+              <a:rPr lang="en-US" altLang="en-US" dirty="0" err="1">
+                <a:latin typeface="Verdana" panose="020B0604030504040204" pitchFamily="34" charset="0"/>
+                <a:cs typeface="Verdana" panose="020B0604030504040204" pitchFamily="34" charset="0"/>
+              </a:rPr>
+              <a:t>Klassendiagramm</a:t>
+            </a:r>
+            <a:r>
+              <a:rPr lang="en-US" altLang="en-US" dirty="0">
+                <a:latin typeface="Verdana" panose="020B0604030504040204" pitchFamily="34" charset="0"/>
+                <a:cs typeface="Verdana" panose="020B0604030504040204" pitchFamily="34" charset="0"/>
+              </a:rPr>
+              <a:t> (Front-End)</a:t>
             </a:r>
           </a:p>
         </p:txBody>
@@ -20907,6 +20517,36 @@
           </a:p>
         </p:txBody>
       </p:sp>
+      <p:pic>
+        <p:nvPicPr>
+          <p:cNvPr id="3" name="Grafik 2">
+            <a:extLst>
+              <a:ext uri="{FF2B5EF4-FFF2-40B4-BE49-F238E27FC236}">
+                <a16:creationId xmlns:a16="http://schemas.microsoft.com/office/drawing/2014/main" id="{41F3F813-C43C-42CD-826C-41C287368D2B}"/>
+              </a:ext>
+            </a:extLst>
+          </p:cNvPr>
+          <p:cNvPicPr>
+            <a:picLocks noChangeAspect="1"/>
+          </p:cNvPicPr>
+          <p:nvPr/>
+        </p:nvPicPr>
+        <p:blipFill>
+          <a:blip r:embed="rId2"/>
+          <a:stretch>
+            <a:fillRect/>
+          </a:stretch>
+        </p:blipFill>
+        <p:spPr>
+          <a:xfrm>
+            <a:off x="0" y="2001762"/>
+            <a:ext cx="12192000" cy="2854476"/>
+          </a:xfrm>
+          <a:prstGeom prst="rect">
+            <a:avLst/>
+          </a:prstGeom>
+        </p:spPr>
+      </p:pic>
     </p:spTree>
   </p:cSld>
   <p:clrMapOvr>
@@ -20916,6 +20556,399 @@
 </file>
 
 <file path=ppt/slides/slide21.xml><?xml version="1.0" encoding="utf-8"?>
+<p:sld xmlns:a="http://schemas.openxmlformats.org/drawingml/2006/main" xmlns:r="http://schemas.openxmlformats.org/officeDocument/2006/relationships" xmlns:p="http://schemas.openxmlformats.org/presentationml/2006/main">
+  <p:cSld>
+    <p:spTree>
+      <p:nvGrpSpPr>
+        <p:cNvPr id="1" name=""/>
+        <p:cNvGrpSpPr/>
+        <p:nvPr/>
+      </p:nvGrpSpPr>
+      <p:grpSpPr>
+        <a:xfrm>
+          <a:off x="0" y="0"/>
+          <a:ext cx="0" cy="0"/>
+          <a:chOff x="0" y="0"/>
+          <a:chExt cx="0" cy="0"/>
+        </a:xfrm>
+      </p:grpSpPr>
+      <p:pic>
+        <p:nvPicPr>
+          <p:cNvPr id="4" name="Grafik 3" descr="Ein Bild, das Text enthält.&#10;&#10;Automatisch generierte Beschreibung">
+            <a:extLst>
+              <a:ext uri="{FF2B5EF4-FFF2-40B4-BE49-F238E27FC236}">
+                <a16:creationId xmlns:a16="http://schemas.microsoft.com/office/drawing/2014/main" id="{890F2ABE-1097-48EF-B805-5584A246A8C9}"/>
+              </a:ext>
+            </a:extLst>
+          </p:cNvPr>
+          <p:cNvPicPr>
+            <a:picLocks noChangeAspect="1"/>
+          </p:cNvPicPr>
+          <p:nvPr/>
+        </p:nvPicPr>
+        <p:blipFill>
+          <a:blip r:embed="rId2"/>
+          <a:stretch>
+            <a:fillRect/>
+          </a:stretch>
+        </p:blipFill>
+        <p:spPr>
+          <a:xfrm>
+            <a:off x="4073319" y="777260"/>
+            <a:ext cx="4699978" cy="5179040"/>
+          </a:xfrm>
+          <a:prstGeom prst="rect">
+            <a:avLst/>
+          </a:prstGeom>
+          <a:noFill/>
+        </p:spPr>
+      </p:pic>
+      <p:sp>
+        <p:nvSpPr>
+          <p:cNvPr id="40962" name="Titel 1">
+            <a:extLst>
+              <a:ext uri="{FF2B5EF4-FFF2-40B4-BE49-F238E27FC236}">
+                <a16:creationId xmlns:a16="http://schemas.microsoft.com/office/drawing/2014/main" id="{32CD7F7C-80CB-4B1C-944E-848F0DCED5C2}"/>
+              </a:ext>
+            </a:extLst>
+          </p:cNvPr>
+          <p:cNvSpPr>
+            <a:spLocks noGrp="1" noChangeArrowheads="1"/>
+          </p:cNvSpPr>
+          <p:nvPr>
+            <p:ph type="title"/>
+          </p:nvPr>
+        </p:nvSpPr>
+        <p:spPr>
+          <a:xfrm>
+            <a:off x="406402" y="238125"/>
+            <a:ext cx="11377084" cy="1162050"/>
+          </a:xfrm>
+        </p:spPr>
+        <p:txBody>
+          <a:bodyPr wrap="square" anchor="t">
+            <a:normAutofit/>
+          </a:bodyPr>
+          <a:lstStyle/>
+          <a:p>
+            <a:pPr eaLnBrk="1" hangingPunct="1"/>
+            <a:r>
+              <a:rPr lang="en-US" altLang="en-US"/>
+              <a:t>UML-</a:t>
+            </a:r>
+            <a:r>
+              <a:rPr lang="en-US" altLang="en-US" err="1"/>
+              <a:t>Klassendiagramm</a:t>
+            </a:r>
+            <a:r>
+              <a:rPr lang="en-US" altLang="en-US"/>
+              <a:t> (Back-End)</a:t>
+            </a:r>
+          </a:p>
+        </p:txBody>
+      </p:sp>
+      <p:sp>
+        <p:nvSpPr>
+          <p:cNvPr id="40963" name="Foliennummernplatzhalter 5">
+            <a:extLst>
+              <a:ext uri="{FF2B5EF4-FFF2-40B4-BE49-F238E27FC236}">
+                <a16:creationId xmlns:a16="http://schemas.microsoft.com/office/drawing/2014/main" id="{CA3BF66F-93DE-404F-8E29-9ABB2F1CADBF}"/>
+              </a:ext>
+            </a:extLst>
+          </p:cNvPr>
+          <p:cNvSpPr>
+            <a:spLocks noGrp="1"/>
+          </p:cNvSpPr>
+          <p:nvPr>
+            <p:ph type="sldNum" sz="quarter" idx="10"/>
+          </p:nvPr>
+        </p:nvSpPr>
+        <p:spPr>
+          <a:xfrm>
+            <a:off x="10755313" y="6429375"/>
+            <a:ext cx="1031875" cy="260350"/>
+          </a:xfrm>
+          <a:extLst>
+            <a:ext uri="{909E8E84-426E-40DD-AFC4-6F175D3DCCD1}">
+              <a14:hiddenFill xmlns:a14="http://schemas.microsoft.com/office/drawing/2010/main">
+                <a:solidFill>
+                  <a:srgbClr val="FFFFFF"/>
+                </a:solidFill>
+              </a14:hiddenFill>
+            </a:ext>
+            <a:ext uri="{91240B29-F687-4F45-9708-019B960494DF}">
+              <a14:hiddenLine xmlns:a14="http://schemas.microsoft.com/office/drawing/2010/main" w="9525">
+                <a:solidFill>
+                  <a:srgbClr val="000000"/>
+                </a:solidFill>
+                <a:miter lim="800000"/>
+                <a:headEnd/>
+                <a:tailEnd/>
+              </a14:hiddenLine>
+            </a:ext>
+          </a:extLst>
+        </p:spPr>
+        <p:txBody>
+          <a:bodyPr wrap="square" anchor="t">
+            <a:normAutofit/>
+          </a:bodyPr>
+          <a:lstStyle>
+            <a:lvl1pPr>
+              <a:lnSpc>
+                <a:spcPct val="90000"/>
+              </a:lnSpc>
+              <a:spcBef>
+                <a:spcPct val="25000"/>
+              </a:spcBef>
+              <a:buClr>
+                <a:srgbClr val="304090"/>
+              </a:buClr>
+              <a:buSzPct val="100000"/>
+              <a:buFont typeface="Arial" panose="020B0604020202020204" pitchFamily="34" charset="0"/>
+              <a:buChar char="•"/>
+              <a:defRPr sz="2000">
+                <a:solidFill>
+                  <a:schemeClr val="tx1"/>
+                </a:solidFill>
+                <a:latin typeface="Verdana" panose="020B0604030504040204" pitchFamily="34" charset="0"/>
+                <a:ea typeface="ＭＳ Ｐゴシック" panose="020B0600070205080204" pitchFamily="34" charset="-128"/>
+                <a:cs typeface="Verdana" panose="020B0604030504040204" pitchFamily="34" charset="0"/>
+              </a:defRPr>
+            </a:lvl1pPr>
+            <a:lvl2pPr marL="37931725" indent="-37474525">
+              <a:lnSpc>
+                <a:spcPct val="90000"/>
+              </a:lnSpc>
+              <a:spcBef>
+                <a:spcPct val="25000"/>
+              </a:spcBef>
+              <a:buClr>
+                <a:srgbClr val="304090"/>
+              </a:buClr>
+              <a:buSzPct val="100000"/>
+              <a:buFont typeface="Arial" panose="020B0604020202020204" pitchFamily="34" charset="0"/>
+              <a:buChar char="•"/>
+              <a:defRPr>
+                <a:solidFill>
+                  <a:schemeClr val="tx1"/>
+                </a:solidFill>
+                <a:latin typeface="Verdana" panose="020B0604030504040204" pitchFamily="34" charset="0"/>
+                <a:ea typeface="ＭＳ Ｐゴシック" panose="020B0600070205080204" pitchFamily="34" charset="-128"/>
+                <a:cs typeface="Verdana" panose="020B0604030504040204" pitchFamily="34" charset="0"/>
+              </a:defRPr>
+            </a:lvl2pPr>
+            <a:lvl3pPr marL="1079500" indent="-287338">
+              <a:lnSpc>
+                <a:spcPct val="90000"/>
+              </a:lnSpc>
+              <a:spcBef>
+                <a:spcPct val="25000"/>
+              </a:spcBef>
+              <a:buClr>
+                <a:srgbClr val="304090"/>
+              </a:buClr>
+              <a:buSzPct val="100000"/>
+              <a:buFont typeface="Arial" panose="020B0604020202020204" pitchFamily="34" charset="0"/>
+              <a:buChar char="•"/>
+              <a:defRPr>
+                <a:solidFill>
+                  <a:schemeClr val="tx1"/>
+                </a:solidFill>
+                <a:latin typeface="Verdana" panose="020B0604030504040204" pitchFamily="34" charset="0"/>
+                <a:ea typeface="ＭＳ Ｐゴシック" panose="020B0600070205080204" pitchFamily="34" charset="-128"/>
+                <a:cs typeface="Verdana" panose="020B0604030504040204" pitchFamily="34" charset="0"/>
+              </a:defRPr>
+            </a:lvl3pPr>
+            <a:lvl4pPr marL="1439863" indent="-287338">
+              <a:lnSpc>
+                <a:spcPct val="90000"/>
+              </a:lnSpc>
+              <a:spcBef>
+                <a:spcPct val="25000"/>
+              </a:spcBef>
+              <a:buClr>
+                <a:srgbClr val="304090"/>
+              </a:buClr>
+              <a:buSzPct val="100000"/>
+              <a:buFont typeface="Arial" panose="020B0604020202020204" pitchFamily="34" charset="0"/>
+              <a:buChar char="•"/>
+              <a:defRPr>
+                <a:solidFill>
+                  <a:schemeClr val="tx1"/>
+                </a:solidFill>
+                <a:latin typeface="Verdana" panose="020B0604030504040204" pitchFamily="34" charset="0"/>
+                <a:ea typeface="ＭＳ Ｐゴシック" panose="020B0600070205080204" pitchFamily="34" charset="-128"/>
+                <a:cs typeface="Verdana" panose="020B0604030504040204" pitchFamily="34" charset="0"/>
+              </a:defRPr>
+            </a:lvl4pPr>
+            <a:lvl5pPr marL="1798638" indent="-287338">
+              <a:lnSpc>
+                <a:spcPct val="90000"/>
+              </a:lnSpc>
+              <a:spcBef>
+                <a:spcPct val="25000"/>
+              </a:spcBef>
+              <a:buClr>
+                <a:srgbClr val="304090"/>
+              </a:buClr>
+              <a:buSzPct val="100000"/>
+              <a:buFont typeface="Arial" panose="020B0604020202020204" pitchFamily="34" charset="0"/>
+              <a:buChar char="•"/>
+              <a:defRPr>
+                <a:solidFill>
+                  <a:schemeClr val="tx1"/>
+                </a:solidFill>
+                <a:latin typeface="Verdana" panose="020B0604030504040204" pitchFamily="34" charset="0"/>
+                <a:ea typeface="ＭＳ Ｐゴシック" panose="020B0600070205080204" pitchFamily="34" charset="-128"/>
+                <a:cs typeface="Verdana" panose="020B0604030504040204" pitchFamily="34" charset="0"/>
+              </a:defRPr>
+            </a:lvl5pPr>
+            <a:lvl6pPr marL="2255838" indent="-287338" eaLnBrk="0" fontAlgn="base" hangingPunct="0">
+              <a:lnSpc>
+                <a:spcPct val="90000"/>
+              </a:lnSpc>
+              <a:spcBef>
+                <a:spcPct val="25000"/>
+              </a:spcBef>
+              <a:spcAft>
+                <a:spcPct val="0"/>
+              </a:spcAft>
+              <a:buClr>
+                <a:srgbClr val="304090"/>
+              </a:buClr>
+              <a:buSzPct val="100000"/>
+              <a:buFont typeface="Arial" panose="020B0604020202020204" pitchFamily="34" charset="0"/>
+              <a:buChar char="•"/>
+              <a:defRPr>
+                <a:solidFill>
+                  <a:schemeClr val="tx1"/>
+                </a:solidFill>
+                <a:latin typeface="Verdana" panose="020B0604030504040204" pitchFamily="34" charset="0"/>
+                <a:ea typeface="ＭＳ Ｐゴシック" panose="020B0600070205080204" pitchFamily="34" charset="-128"/>
+                <a:cs typeface="Verdana" panose="020B0604030504040204" pitchFamily="34" charset="0"/>
+              </a:defRPr>
+            </a:lvl6pPr>
+            <a:lvl7pPr marL="2713038" indent="-287338" eaLnBrk="0" fontAlgn="base" hangingPunct="0">
+              <a:lnSpc>
+                <a:spcPct val="90000"/>
+              </a:lnSpc>
+              <a:spcBef>
+                <a:spcPct val="25000"/>
+              </a:spcBef>
+              <a:spcAft>
+                <a:spcPct val="0"/>
+              </a:spcAft>
+              <a:buClr>
+                <a:srgbClr val="304090"/>
+              </a:buClr>
+              <a:buSzPct val="100000"/>
+              <a:buFont typeface="Arial" panose="020B0604020202020204" pitchFamily="34" charset="0"/>
+              <a:buChar char="•"/>
+              <a:defRPr>
+                <a:solidFill>
+                  <a:schemeClr val="tx1"/>
+                </a:solidFill>
+                <a:latin typeface="Verdana" panose="020B0604030504040204" pitchFamily="34" charset="0"/>
+                <a:ea typeface="ＭＳ Ｐゴシック" panose="020B0600070205080204" pitchFamily="34" charset="-128"/>
+                <a:cs typeface="Verdana" panose="020B0604030504040204" pitchFamily="34" charset="0"/>
+              </a:defRPr>
+            </a:lvl7pPr>
+            <a:lvl8pPr marL="3170238" indent="-287338" eaLnBrk="0" fontAlgn="base" hangingPunct="0">
+              <a:lnSpc>
+                <a:spcPct val="90000"/>
+              </a:lnSpc>
+              <a:spcBef>
+                <a:spcPct val="25000"/>
+              </a:spcBef>
+              <a:spcAft>
+                <a:spcPct val="0"/>
+              </a:spcAft>
+              <a:buClr>
+                <a:srgbClr val="304090"/>
+              </a:buClr>
+              <a:buSzPct val="100000"/>
+              <a:buFont typeface="Arial" panose="020B0604020202020204" pitchFamily="34" charset="0"/>
+              <a:buChar char="•"/>
+              <a:defRPr>
+                <a:solidFill>
+                  <a:schemeClr val="tx1"/>
+                </a:solidFill>
+                <a:latin typeface="Verdana" panose="020B0604030504040204" pitchFamily="34" charset="0"/>
+                <a:ea typeface="ＭＳ Ｐゴシック" panose="020B0600070205080204" pitchFamily="34" charset="-128"/>
+                <a:cs typeface="Verdana" panose="020B0604030504040204" pitchFamily="34" charset="0"/>
+              </a:defRPr>
+            </a:lvl8pPr>
+            <a:lvl9pPr marL="3627438" indent="-287338" eaLnBrk="0" fontAlgn="base" hangingPunct="0">
+              <a:lnSpc>
+                <a:spcPct val="90000"/>
+              </a:lnSpc>
+              <a:spcBef>
+                <a:spcPct val="25000"/>
+              </a:spcBef>
+              <a:spcAft>
+                <a:spcPct val="0"/>
+              </a:spcAft>
+              <a:buClr>
+                <a:srgbClr val="304090"/>
+              </a:buClr>
+              <a:buSzPct val="100000"/>
+              <a:buFont typeface="Arial" panose="020B0604020202020204" pitchFamily="34" charset="0"/>
+              <a:buChar char="•"/>
+              <a:defRPr>
+                <a:solidFill>
+                  <a:schemeClr val="tx1"/>
+                </a:solidFill>
+                <a:latin typeface="Verdana" panose="020B0604030504040204" pitchFamily="34" charset="0"/>
+                <a:ea typeface="ＭＳ Ｐゴシック" panose="020B0600070205080204" pitchFamily="34" charset="-128"/>
+                <a:cs typeface="Verdana" panose="020B0604030504040204" pitchFamily="34" charset="0"/>
+              </a:defRPr>
+            </a:lvl9pPr>
+          </a:lstStyle>
+          <a:p>
+            <a:pPr>
+              <a:spcBef>
+                <a:spcPct val="50000"/>
+              </a:spcBef>
+              <a:buClr>
+                <a:schemeClr val="tx2"/>
+              </a:buClr>
+              <a:buSzPct val="75000"/>
+              <a:buFont typeface="Wingdings" panose="05000000000000000000" pitchFamily="2" charset="2"/>
+              <a:buNone/>
+            </a:pPr>
+            <a:fld id="{B75257EB-88AD-402D-9685-AD1A771C891A}" type="slidenum">
+              <a:rPr lang="de-DE" altLang="en-US" sz="1200" smtClean="0"/>
+              <a:pPr>
+                <a:spcBef>
+                  <a:spcPct val="50000"/>
+                </a:spcBef>
+                <a:buClr>
+                  <a:schemeClr val="tx2"/>
+                </a:buClr>
+                <a:buSzPct val="75000"/>
+                <a:buFont typeface="Wingdings" panose="05000000000000000000" pitchFamily="2" charset="2"/>
+                <a:buNone/>
+              </a:pPr>
+              <a:t>21</a:t>
+            </a:fld>
+            <a:endParaRPr lang="de-DE" altLang="en-US" sz="1200"/>
+          </a:p>
+        </p:txBody>
+      </p:sp>
+    </p:spTree>
+    <p:extLst>
+      <p:ext uri="{BB962C8B-B14F-4D97-AF65-F5344CB8AC3E}">
+        <p14:creationId xmlns:p14="http://schemas.microsoft.com/office/powerpoint/2010/main" val="1711062250"/>
+      </p:ext>
+    </p:extLst>
+  </p:cSld>
+  <p:clrMapOvr>
+    <a:masterClrMapping/>
+  </p:clrMapOvr>
+</p:sld>
+</file>
+
+<file path=ppt/slides/slide22.xml><?xml version="1.0" encoding="utf-8"?>
 <p:sld xmlns:a="http://schemas.openxmlformats.org/drawingml/2006/main" xmlns:r="http://schemas.openxmlformats.org/officeDocument/2006/relationships" xmlns:p="http://schemas.openxmlformats.org/presentationml/2006/main">
   <p:cSld>
     <p:spTree>
@@ -21126,7 +21159,7 @@
                 <a:latin typeface="Verdana" panose="020B0604030504040204" pitchFamily="34" charset="0"/>
               </a:rPr>
               <a:pPr/>
-              <a:t>21</a:t>
+              <a:t>22</a:t>
             </a:fld>
             <a:endParaRPr lang="de-DE" altLang="en-US" sz="1200">
               <a:latin typeface="Verdana" panose="020B0604030504040204" pitchFamily="34" charset="0"/>
@@ -23170,12 +23203,30 @@
           <a:p>
             <a:pPr eaLnBrk="1" hangingPunct="1"/>
             <a:r>
-              <a:rPr lang="en-US" altLang="en-US">
+              <a:rPr lang="en-US" altLang="en-US" dirty="0" err="1">
                 <a:latin typeface="Verdana" panose="020B0604030504040204" pitchFamily="34" charset="0"/>
                 <a:cs typeface="Verdana" panose="020B0604030504040204" pitchFamily="34" charset="0"/>
               </a:rPr>
               <a:t>bMSC</a:t>
             </a:r>
+            <a:r>
+              <a:rPr lang="en-US" altLang="en-US" dirty="0">
+                <a:latin typeface="Verdana" panose="020B0604030504040204" pitchFamily="34" charset="0"/>
+                <a:cs typeface="Verdana" panose="020B0604030504040204" pitchFamily="34" charset="0"/>
+              </a:rPr>
+              <a:t> – </a:t>
+            </a:r>
+            <a:r>
+              <a:rPr lang="en-US" altLang="en-US" dirty="0" err="1">
+                <a:latin typeface="Verdana" panose="020B0604030504040204" pitchFamily="34" charset="0"/>
+                <a:cs typeface="Verdana" panose="020B0604030504040204" pitchFamily="34" charset="0"/>
+              </a:rPr>
+              <a:t>Registrierung</a:t>
+            </a:r>
+            <a:endParaRPr lang="en-US" altLang="en-US" dirty="0">
+              <a:latin typeface="Verdana" panose="020B0604030504040204" pitchFamily="34" charset="0"/>
+              <a:cs typeface="Verdana" panose="020B0604030504040204" pitchFamily="34" charset="0"/>
+            </a:endParaRPr>
           </a:p>
         </p:txBody>
       </p:sp>

</xml_diff>